<commit_message>
Actualizando Seccion 1 Diapos
</commit_message>
<xml_diff>
--- a/Seccion 1 Introducción al espacio multivariante/Diapositivas/1.11 Transformaciones lineales.pptx
+++ b/Seccion 1 Introducción al espacio multivariante/Diapositivas/1.11 Transformaciones lineales.pptx
@@ -270,7 +270,7 @@
             <a:fld id="{B61BEF0D-F0BB-DE4B-95CE-6DB70DBA9567}" type="datetimeFigureOut">
               <a:rPr lang="en-US" smtClean="0"/>
               <a:pPr/>
-              <a:t>12/11/2019</a:t>
+              <a:t>3/20/2020</a:t>
             </a:fld>
             <a:endParaRPr lang="en-US" dirty="0"/>
           </a:p>
@@ -469,7 +469,7 @@
           <a:p>
             <a:fld id="{55C6B4A9-1611-4792-9094-5F34BCA07E0B}" type="datetimeFigureOut">
               <a:rPr lang="en-US" smtClean="0"/>
-              <a:t>12/11/2019</a:t>
+              <a:t>3/20/2020</a:t>
             </a:fld>
             <a:endParaRPr lang="en-US" dirty="0"/>
           </a:p>
@@ -678,7 +678,7 @@
             <a:fld id="{B61BEF0D-F0BB-DE4B-95CE-6DB70DBA9567}" type="datetimeFigureOut">
               <a:rPr lang="en-US" smtClean="0"/>
               <a:pPr/>
-              <a:t>12/11/2019</a:t>
+              <a:t>3/20/2020</a:t>
             </a:fld>
             <a:endParaRPr lang="en-US" dirty="0"/>
           </a:p>
@@ -1498,7 +1498,7 @@
             <a:fld id="{B61BEF0D-F0BB-DE4B-95CE-6DB70DBA9567}" type="datetimeFigureOut">
               <a:rPr lang="en-US" smtClean="0"/>
               <a:pPr/>
-              <a:t>12/11/2019</a:t>
+              <a:t>3/20/2020</a:t>
             </a:fld>
             <a:endParaRPr lang="en-US" dirty="0"/>
           </a:p>
@@ -1670,7 +1670,7 @@
             <a:fld id="{B61BEF0D-F0BB-DE4B-95CE-6DB70DBA9567}" type="datetimeFigureOut">
               <a:rPr lang="en-US" smtClean="0"/>
               <a:pPr/>
-              <a:t>12/11/2019</a:t>
+              <a:t>3/20/2020</a:t>
             </a:fld>
             <a:endParaRPr lang="en-US" dirty="0"/>
           </a:p>
@@ -1919,7 +1919,7 @@
             <a:fld id="{B61BEF0D-F0BB-DE4B-95CE-6DB70DBA9567}" type="datetimeFigureOut">
               <a:rPr lang="en-US" smtClean="0"/>
               <a:pPr/>
-              <a:t>12/11/2019</a:t>
+              <a:t>3/20/2020</a:t>
             </a:fld>
             <a:endParaRPr lang="en-US" dirty="0"/>
           </a:p>
@@ -2152,7 +2152,7 @@
           <a:p>
             <a:fld id="{EB712588-04B1-427B-82EE-E8DB90309F08}" type="datetimeFigureOut">
               <a:rPr lang="en-US" smtClean="0"/>
-              <a:t>12/11/2019</a:t>
+              <a:t>3/20/2020</a:t>
             </a:fld>
             <a:endParaRPr lang="en-US" dirty="0"/>
           </a:p>
@@ -2527,7 +2527,7 @@
             <a:fld id="{B61BEF0D-F0BB-DE4B-95CE-6DB70DBA9567}" type="datetimeFigureOut">
               <a:rPr lang="en-US" smtClean="0"/>
               <a:pPr/>
-              <a:t>12/11/2019</a:t>
+              <a:t>3/20/2020</a:t>
             </a:fld>
             <a:endParaRPr lang="en-US" dirty="0"/>
           </a:p>
@@ -2652,7 +2652,7 @@
             <a:fld id="{B61BEF0D-F0BB-DE4B-95CE-6DB70DBA9567}" type="datetimeFigureOut">
               <a:rPr lang="en-US" smtClean="0"/>
               <a:pPr/>
-              <a:t>12/11/2019</a:t>
+              <a:t>3/20/2020</a:t>
             </a:fld>
             <a:endParaRPr lang="en-US" dirty="0"/>
           </a:p>
@@ -2749,7 +2749,7 @@
             <a:fld id="{B61BEF0D-F0BB-DE4B-95CE-6DB70DBA9567}" type="datetimeFigureOut">
               <a:rPr lang="en-US" smtClean="0"/>
               <a:pPr/>
-              <a:t>12/11/2019</a:t>
+              <a:t>3/20/2020</a:t>
             </a:fld>
             <a:endParaRPr lang="en-US" dirty="0"/>
           </a:p>
@@ -3005,7 +3005,7 @@
           <a:p>
             <a:fld id="{42A54C80-263E-416B-A8E0-580EDEADCBDC}" type="datetimeFigureOut">
               <a:rPr lang="en-US" smtClean="0"/>
-              <a:t>12/11/2019</a:t>
+              <a:t>3/20/2020</a:t>
             </a:fld>
             <a:endParaRPr lang="en-US" dirty="0"/>
           </a:p>
@@ -3192,7 +3192,7 @@
             <a:fld id="{B61BEF0D-F0BB-DE4B-95CE-6DB70DBA9567}" type="datetimeFigureOut">
               <a:rPr lang="en-US" smtClean="0"/>
               <a:pPr/>
-              <a:t>12/11/2019</a:t>
+              <a:t>3/20/2020</a:t>
             </a:fld>
             <a:endParaRPr lang="en-US" dirty="0"/>
           </a:p>
@@ -3512,7 +3512,7 @@
             <a:fld id="{B61BEF0D-F0BB-DE4B-95CE-6DB70DBA9567}" type="datetimeFigureOut">
               <a:rPr lang="en-US" smtClean="0"/>
               <a:pPr/>
-              <a:t>12/11/2019</a:t>
+              <a:t>3/20/2020</a:t>
             </a:fld>
             <a:endParaRPr lang="en-US" dirty="0"/>
           </a:p>
@@ -3722,7 +3722,7 @@
             <a:fld id="{B61BEF0D-F0BB-DE4B-95CE-6DB70DBA9567}" type="datetimeFigureOut">
               <a:rPr lang="en-US" smtClean="0"/>
               <a:pPr/>
-              <a:t>12/11/2019</a:t>
+              <a:t>3/20/2020</a:t>
             </a:fld>
             <a:endParaRPr lang="en-US" dirty="0"/>
           </a:p>
@@ -4038,7 +4038,7 @@
             <a:fld id="{B61BEF0D-F0BB-DE4B-95CE-6DB70DBA9567}" type="datetimeFigureOut">
               <a:rPr lang="en-US" smtClean="0"/>
               <a:pPr/>
-              <a:t>12/11/2019</a:t>
+              <a:t>3/20/2020</a:t>
             </a:fld>
             <a:endParaRPr lang="en-US" dirty="0"/>
           </a:p>
@@ -4373,7 +4373,7 @@
             <a:fld id="{B61BEF0D-F0BB-DE4B-95CE-6DB70DBA9567}" type="datetimeFigureOut">
               <a:rPr lang="en-US" smtClean="0"/>
               <a:pPr/>
-              <a:t>12/11/2019</a:t>
+              <a:t>3/20/2020</a:t>
             </a:fld>
             <a:endParaRPr lang="en-US" dirty="0"/>
           </a:p>
@@ -4689,7 +4689,7 @@
             <a:fld id="{B61BEF0D-F0BB-DE4B-95CE-6DB70DBA9567}" type="datetimeFigureOut">
               <a:rPr lang="en-US" smtClean="0"/>
               <a:pPr/>
-              <a:t>12/11/2019</a:t>
+              <a:t>3/20/2020</a:t>
             </a:fld>
             <a:endParaRPr lang="en-US" dirty="0"/>
           </a:p>
@@ -5084,7 +5084,7 @@
             <a:fld id="{B61BEF0D-F0BB-DE4B-95CE-6DB70DBA9567}" type="datetimeFigureOut">
               <a:rPr lang="en-US" smtClean="0"/>
               <a:pPr/>
-              <a:t>12/11/2019</a:t>
+              <a:t>3/20/2020</a:t>
             </a:fld>
             <a:endParaRPr lang="en-US" dirty="0"/>
           </a:p>
@@ -5255,7 +5255,7 @@
           <a:p>
             <a:fld id="{55C6B4A9-1611-4792-9094-5F34BCA07E0B}" type="datetimeFigureOut">
               <a:rPr lang="en-US" smtClean="0"/>
-              <a:t>12/11/2019</a:t>
+              <a:t>3/20/2020</a:t>
             </a:fld>
             <a:endParaRPr lang="en-US" dirty="0"/>
           </a:p>
@@ -5436,7 +5436,7 @@
             <a:fld id="{B61BEF0D-F0BB-DE4B-95CE-6DB70DBA9567}" type="datetimeFigureOut">
               <a:rPr lang="en-US" smtClean="0"/>
               <a:pPr/>
-              <a:t>12/11/2019</a:t>
+              <a:t>3/20/2020</a:t>
             </a:fld>
             <a:endParaRPr lang="en-US" dirty="0"/>
           </a:p>
@@ -5701,7 +5701,7 @@
             <a:fld id="{B61BEF0D-F0BB-DE4B-95CE-6DB70DBA9567}" type="datetimeFigureOut">
               <a:rPr lang="en-US" smtClean="0"/>
               <a:pPr/>
-              <a:t>12/11/2019</a:t>
+              <a:t>3/20/2020</a:t>
             </a:fld>
             <a:endParaRPr lang="en-US" dirty="0"/>
           </a:p>
@@ -5967,7 +5967,7 @@
           <a:p>
             <a:fld id="{EB712588-04B1-427B-82EE-E8DB90309F08}" type="datetimeFigureOut">
               <a:rPr lang="en-US" smtClean="0"/>
-              <a:t>12/11/2019</a:t>
+              <a:t>3/20/2020</a:t>
             </a:fld>
             <a:endParaRPr lang="en-US" dirty="0"/>
           </a:p>
@@ -6380,7 +6380,7 @@
             <a:fld id="{B61BEF0D-F0BB-DE4B-95CE-6DB70DBA9567}" type="datetimeFigureOut">
               <a:rPr lang="en-US" smtClean="0"/>
               <a:pPr/>
-              <a:t>12/11/2019</a:t>
+              <a:t>3/20/2020</a:t>
             </a:fld>
             <a:endParaRPr lang="en-US" dirty="0"/>
           </a:p>
@@ -6523,7 +6523,7 @@
             <a:fld id="{B61BEF0D-F0BB-DE4B-95CE-6DB70DBA9567}" type="datetimeFigureOut">
               <a:rPr lang="en-US" smtClean="0"/>
               <a:pPr/>
-              <a:t>12/11/2019</a:t>
+              <a:t>3/20/2020</a:t>
             </a:fld>
             <a:endParaRPr lang="en-US" dirty="0"/>
           </a:p>
@@ -6638,7 +6638,7 @@
             <a:fld id="{B61BEF0D-F0BB-DE4B-95CE-6DB70DBA9567}" type="datetimeFigureOut">
               <a:rPr lang="en-US" smtClean="0"/>
               <a:pPr/>
-              <a:t>12/11/2019</a:t>
+              <a:t>3/20/2020</a:t>
             </a:fld>
             <a:endParaRPr lang="en-US" dirty="0"/>
           </a:p>
@@ -6950,7 +6950,7 @@
           <a:p>
             <a:fld id="{42A54C80-263E-416B-A8E0-580EDEADCBDC}" type="datetimeFigureOut">
               <a:rPr lang="en-US" smtClean="0"/>
-              <a:t>12/11/2019</a:t>
+              <a:t>3/20/2020</a:t>
             </a:fld>
             <a:endParaRPr lang="en-US" dirty="0"/>
           </a:p>
@@ -7239,7 +7239,7 @@
             <a:fld id="{B61BEF0D-F0BB-DE4B-95CE-6DB70DBA9567}" type="datetimeFigureOut">
               <a:rPr lang="en-US" smtClean="0"/>
               <a:pPr/>
-              <a:t>12/11/2019</a:t>
+              <a:t>3/20/2020</a:t>
             </a:fld>
             <a:endParaRPr lang="en-US" dirty="0"/>
           </a:p>
@@ -7482,7 +7482,7 @@
             <a:fld id="{B61BEF0D-F0BB-DE4B-95CE-6DB70DBA9567}" type="datetimeFigureOut">
               <a:rPr lang="en-US" smtClean="0"/>
               <a:pPr/>
-              <a:t>12/11/2019</a:t>
+              <a:t>3/20/2020</a:t>
             </a:fld>
             <a:endParaRPr lang="en-US" dirty="0"/>
           </a:p>
@@ -8567,7 +8567,7 @@
             <a:fld id="{B61BEF0D-F0BB-DE4B-95CE-6DB70DBA9567}" type="datetimeFigureOut">
               <a:rPr lang="en-US" smtClean="0"/>
               <a:pPr/>
-              <a:t>12/11/2019</a:t>
+              <a:t>3/20/2020</a:t>
             </a:fld>
             <a:endParaRPr lang="en-US" dirty="0"/>
           </a:p>
@@ -10379,9 +10379,6 @@
               </a:bodyPr>
               <a:lstStyle/>
               <a:p>
-                <a:pPr marL="0" indent="0">
-                  <a:buNone/>
-                </a:pPr>
                 <a:r>
                   <a:rPr lang="es-ES" sz="2000" dirty="0">
                     <a:solidFill>
@@ -11381,14 +11378,14 @@
                                   </m:e>
                                   <m:sub>
                                     <m:r>
-                                      <a:rPr lang="es-ES" sz="2000" b="0" i="1">
+                                      <a:rPr lang="es-ES" sz="2000" b="0" i="1" smtClean="0">
                                         <a:solidFill>
                                           <a:srgbClr val="92D050"/>
                                         </a:solidFill>
                                         <a:latin typeface="Cambria Math" panose="02040503050406030204" pitchFamily="18" charset="0"/>
                                         <a:cs typeface="Calibri" panose="020F0502020204030204" pitchFamily="34" charset="0"/>
                                       </a:rPr>
-                                      <m:t>𝑝</m:t>
+                                      <m:t>𝑛</m:t>
                                     </m:r>
                                   </m:sub>
                                 </m:sSub>
@@ -11838,7 +11835,7 @@
                       <m:accPr>
                         <m:chr m:val="̅"/>
                         <m:ctrlPr>
-                          <a:rPr lang="es-ES" sz="2000" b="1">
+                          <a:rPr lang="es-ES" sz="2000" b="1" i="1">
                             <a:solidFill>
                               <a:schemeClr val="bg1"/>
                             </a:solidFill>
@@ -12276,8 +12273,8 @@
           </a:p>
         </p:txBody>
       </p:sp>
-      <mc:AlternateContent xmlns:mc="http://schemas.openxmlformats.org/markup-compatibility/2006">
-        <mc:Choice xmlns:a14="http://schemas.microsoft.com/office/drawing/2010/main" Requires="a14">
+      <mc:AlternateContent xmlns:mc="http://schemas.openxmlformats.org/markup-compatibility/2006" xmlns:a14="http://schemas.microsoft.com/office/drawing/2010/main">
+        <mc:Choice Requires="a14">
           <p:sp>
             <p:nvSpPr>
               <p:cNvPr id="3" name="Marcador de contenido 2">
@@ -14108,7 +14105,7 @@
             </p:txBody>
           </p:sp>
         </mc:Choice>
-        <mc:Fallback>
+        <mc:Fallback xmlns="">
           <p:sp>
             <p:nvSpPr>
               <p:cNvPr id="3" name="Marcador de contenido 2">
@@ -14232,8 +14229,8 @@
           </a:p>
         </p:txBody>
       </p:sp>
-      <mc:AlternateContent xmlns:mc="http://schemas.openxmlformats.org/markup-compatibility/2006">
-        <mc:Choice xmlns:a14="http://schemas.microsoft.com/office/drawing/2010/main" Requires="a14">
+      <mc:AlternateContent xmlns:mc="http://schemas.openxmlformats.org/markup-compatibility/2006" xmlns:a14="http://schemas.microsoft.com/office/drawing/2010/main">
+        <mc:Choice Requires="a14">
           <p:sp>
             <p:nvSpPr>
               <p:cNvPr id="3" name="Marcador de contenido 2">
@@ -14819,7 +14816,7 @@
             </p:txBody>
           </p:sp>
         </mc:Choice>
-        <mc:Fallback>
+        <mc:Fallback xmlns="">
           <p:sp>
             <p:nvSpPr>
               <p:cNvPr id="3" name="Marcador de contenido 2">
@@ -14943,8 +14940,8 @@
           </a:p>
         </p:txBody>
       </p:sp>
-      <mc:AlternateContent xmlns:mc="http://schemas.openxmlformats.org/markup-compatibility/2006">
-        <mc:Choice xmlns:a14="http://schemas.microsoft.com/office/drawing/2010/main" Requires="a14">
+      <mc:AlternateContent xmlns:mc="http://schemas.openxmlformats.org/markup-compatibility/2006" xmlns:a14="http://schemas.microsoft.com/office/drawing/2010/main">
+        <mc:Choice Requires="a14">
           <p:sp>
             <p:nvSpPr>
               <p:cNvPr id="3" name="Marcador de contenido 2">
@@ -15269,7 +15266,7 @@
                         <m:accPr>
                           <m:chr m:val="̅"/>
                           <m:ctrlPr>
-                            <a:rPr lang="es-ES" sz="2000" b="1">
+                            <a:rPr lang="es-ES" sz="2000" b="1" i="1">
                               <a:solidFill>
                                 <a:schemeClr val="bg1"/>
                               </a:solidFill>
@@ -15785,7 +15782,7 @@
             </p:txBody>
           </p:sp>
         </mc:Choice>
-        <mc:Fallback>
+        <mc:Fallback xmlns="">
           <p:sp>
             <p:nvSpPr>
               <p:cNvPr id="3" name="Marcador de contenido 2">
@@ -15898,8 +15895,8 @@
           </a:p>
         </p:txBody>
       </p:sp>
-      <mc:AlternateContent xmlns:mc="http://schemas.openxmlformats.org/markup-compatibility/2006">
-        <mc:Choice xmlns:a14="http://schemas.microsoft.com/office/drawing/2010/main" Requires="a14">
+      <mc:AlternateContent xmlns:mc="http://schemas.openxmlformats.org/markup-compatibility/2006" xmlns:a14="http://schemas.microsoft.com/office/drawing/2010/main">
+        <mc:Choice Requires="a14">
           <p:sp>
             <p:nvSpPr>
               <p:cNvPr id="3" name="Marcador de contenido 2">
@@ -16976,7 +16973,7 @@
             </p:txBody>
           </p:sp>
         </mc:Choice>
-        <mc:Fallback>
+        <mc:Fallback xmlns="">
           <p:sp>
             <p:nvSpPr>
               <p:cNvPr id="3" name="Marcador de contenido 2">
@@ -17089,8 +17086,8 @@
           </a:p>
         </p:txBody>
       </p:sp>
-      <mc:AlternateContent xmlns:mc="http://schemas.openxmlformats.org/markup-compatibility/2006">
-        <mc:Choice xmlns:a14="http://schemas.microsoft.com/office/drawing/2010/main" Requires="a14">
+      <mc:AlternateContent xmlns:mc="http://schemas.openxmlformats.org/markup-compatibility/2006" xmlns:a14="http://schemas.microsoft.com/office/drawing/2010/main">
+        <mc:Choice Requires="a14">
           <p:sp>
             <p:nvSpPr>
               <p:cNvPr id="3" name="Marcador de contenido 2">
@@ -17836,7 +17833,7 @@
             </p:txBody>
           </p:sp>
         </mc:Choice>
-        <mc:Fallback>
+        <mc:Fallback xmlns="">
           <p:sp>
             <p:nvSpPr>
               <p:cNvPr id="3" name="Marcador de contenido 2">

</xml_diff>